<commit_message>
GW: Progressed presentation & writeup
</commit_message>
<xml_diff>
--- a/Presentation.pptx
+++ b/Presentation.pptx
@@ -12,8 +12,8 @@
     <p:sldId id="262" r:id="rId6"/>
     <p:sldId id="263" r:id="rId7"/>
     <p:sldId id="264" r:id="rId8"/>
-    <p:sldId id="266" r:id="rId9"/>
-    <p:sldId id="267" r:id="rId10"/>
+    <p:sldId id="267" r:id="rId9"/>
+    <p:sldId id="266" r:id="rId10"/>
     <p:sldId id="265" r:id="rId11"/>
     <p:sldId id="269" r:id="rId12"/>
     <p:sldId id="270" r:id="rId13"/>
@@ -115,6 +115,11 @@
       </a:defRPr>
     </a:lvl9pPr>
   </p:defaultTextStyle>
+  <p:extLst>
+    <p:ext uri="{EFAFB233-063F-42B5-8137-9DF3F51BA10A}">
+      <p15:sldGuideLst xmlns:p15="http://schemas.microsoft.com/office/powerpoint/2012/main"/>
+    </p:ext>
+  </p:extLst>
 </p:presentation>
 </file>
 
@@ -292,7 +297,7 @@
             <a:fld id="{87DE6118-2437-4B30-8E3C-4D2BE6020583}" type="datetimeFigureOut">
               <a:rPr lang="en-US" smtClean="0"/>
               <a:pPr/>
-              <a:t>5/20/2020</a:t>
+              <a:t>5/21/2020</a:t>
             </a:fld>
             <a:endParaRPr lang="en-US" dirty="0"/>
           </a:p>
@@ -623,7 +628,7 @@
           <a:p>
             <a:fld id="{87DE6118-2437-4B30-8E3C-4D2BE6020583}" type="datetimeFigureOut">
               <a:rPr lang="en-US" smtClean="0"/>
-              <a:t>5/20/2020</a:t>
+              <a:t>5/21/2020</a:t>
             </a:fld>
             <a:endParaRPr lang="en-US" dirty="0"/>
           </a:p>
@@ -803,7 +808,7 @@
           <a:p>
             <a:fld id="{87DE6118-2437-4B30-8E3C-4D2BE6020583}" type="datetimeFigureOut">
               <a:rPr lang="en-US" smtClean="0"/>
-              <a:t>5/20/2020</a:t>
+              <a:t>5/21/2020</a:t>
             </a:fld>
             <a:endParaRPr lang="en-US" dirty="0"/>
           </a:p>
@@ -973,7 +978,7 @@
           <a:p>
             <a:fld id="{87DE6118-2437-4B30-8E3C-4D2BE6020583}" type="datetimeFigureOut">
               <a:rPr lang="en-US" smtClean="0"/>
-              <a:t>5/20/2020</a:t>
+              <a:t>5/21/2020</a:t>
             </a:fld>
             <a:endParaRPr lang="en-US" dirty="0"/>
           </a:p>
@@ -1251,7 +1256,7 @@
             <a:fld id="{87DE6118-2437-4B30-8E3C-4D2BE6020583}" type="datetimeFigureOut">
               <a:rPr lang="en-US" smtClean="0"/>
               <a:pPr/>
-              <a:t>5/20/2020</a:t>
+              <a:t>5/21/2020</a:t>
             </a:fld>
             <a:endParaRPr lang="en-US" dirty="0"/>
           </a:p>
@@ -1646,7 +1651,7 @@
           <a:p>
             <a:fld id="{87DE6118-2437-4B30-8E3C-4D2BE6020583}" type="datetimeFigureOut">
               <a:rPr lang="en-US" smtClean="0"/>
-              <a:t>5/20/2020</a:t>
+              <a:t>5/21/2020</a:t>
             </a:fld>
             <a:endParaRPr lang="en-US" dirty="0"/>
           </a:p>
@@ -2123,7 +2128,7 @@
           <a:p>
             <a:fld id="{87DE6118-2437-4B30-8E3C-4D2BE6020583}" type="datetimeFigureOut">
               <a:rPr lang="en-US" smtClean="0"/>
-              <a:t>5/20/2020</a:t>
+              <a:t>5/21/2020</a:t>
             </a:fld>
             <a:endParaRPr lang="en-US" dirty="0"/>
           </a:p>
@@ -2241,7 +2246,7 @@
           <a:p>
             <a:fld id="{87DE6118-2437-4B30-8E3C-4D2BE6020583}" type="datetimeFigureOut">
               <a:rPr lang="en-US" smtClean="0"/>
-              <a:t>5/20/2020</a:t>
+              <a:t>5/21/2020</a:t>
             </a:fld>
             <a:endParaRPr lang="en-US" dirty="0"/>
           </a:p>
@@ -2336,7 +2341,7 @@
           <a:p>
             <a:fld id="{87DE6118-2437-4B30-8E3C-4D2BE6020583}" type="datetimeFigureOut">
               <a:rPr lang="en-US" smtClean="0"/>
-              <a:t>5/20/2020</a:t>
+              <a:t>5/21/2020</a:t>
             </a:fld>
             <a:endParaRPr lang="en-US" dirty="0"/>
           </a:p>
@@ -2683,7 +2688,7 @@
             <a:fld id="{87DE6118-2437-4B30-8E3C-4D2BE6020583}" type="datetimeFigureOut">
               <a:rPr lang="en-US" smtClean="0"/>
               <a:pPr/>
-              <a:t>5/20/2020</a:t>
+              <a:t>5/21/2020</a:t>
             </a:fld>
             <a:endParaRPr lang="en-US" dirty="0"/>
           </a:p>
@@ -3073,7 +3078,7 @@
             <a:fld id="{87DE6118-2437-4B30-8E3C-4D2BE6020583}" type="datetimeFigureOut">
               <a:rPr lang="en-US" smtClean="0"/>
               <a:pPr/>
-              <a:t>5/20/2020</a:t>
+              <a:t>5/21/2020</a:t>
             </a:fld>
             <a:endParaRPr lang="en-US" dirty="0"/>
           </a:p>
@@ -3353,7 +3358,7 @@
             <a:fld id="{87DE6118-2437-4B30-8E3C-4D2BE6020583}" type="datetimeFigureOut">
               <a:rPr lang="en-US" smtClean="0"/>
               <a:pPr/>
-              <a:t>5/20/2020</a:t>
+              <a:t>5/21/2020</a:t>
             </a:fld>
             <a:endParaRPr lang="en-US" dirty="0"/>
           </a:p>
@@ -4401,22 +4406,14 @@
           </a:p>
           <a:p>
             <a:r>
-              <a:rPr lang="en-US" dirty="0" err="1" smtClean="0"/>
-              <a:t>PyPy</a:t>
-            </a:r>
-            <a:r>
-              <a:rPr lang="en-US" dirty="0" smtClean="0"/>
-              <a:t> 2</a:t>
-            </a:r>
-          </a:p>
-          <a:p>
-            <a:r>
-              <a:rPr lang="en-US" dirty="0" err="1" smtClean="0"/>
-              <a:t>PyPy</a:t>
-            </a:r>
-            <a:r>
-              <a:rPr lang="en-US" dirty="0" smtClean="0"/>
-              <a:t> 3</a:t>
+              <a:rPr lang="en-US" dirty="0" smtClean="0"/>
+              <a:t>PyPy 2</a:t>
+            </a:r>
+          </a:p>
+          <a:p>
+            <a:r>
+              <a:rPr lang="en-US" dirty="0" smtClean="0"/>
+              <a:t>PyPy 3</a:t>
             </a:r>
           </a:p>
           <a:p>
@@ -4970,7 +4967,97 @@
           <a:p>
             <a:r>
               <a:rPr lang="en-US" dirty="0" smtClean="0"/>
-              <a:t>And then you explain what it is and why its faster than others (usually)</a:t>
+              <a:t>An implementation of Python that uses a tracing just-in-time (JIT) compiler</a:t>
+            </a:r>
+          </a:p>
+          <a:p>
+            <a:pPr lvl="1"/>
+            <a:r>
+              <a:rPr lang="en-US" dirty="0" smtClean="0"/>
+              <a:t>Like most compilers, is faster than </a:t>
+            </a:r>
+            <a:r>
+              <a:rPr lang="en-US" dirty="0" err="1" smtClean="0"/>
+              <a:t>CPython’s</a:t>
+            </a:r>
+            <a:r>
+              <a:rPr lang="en-US" dirty="0" smtClean="0"/>
+              <a:t> interpreter</a:t>
+            </a:r>
+          </a:p>
+          <a:p>
+            <a:pPr lvl="1"/>
+            <a:r>
+              <a:rPr lang="en-US" dirty="0" smtClean="0"/>
+              <a:t>Ends up being faster than </a:t>
+            </a:r>
+            <a:r>
+              <a:rPr lang="en-US" dirty="0" err="1" smtClean="0"/>
+              <a:t>IronPython</a:t>
+            </a:r>
+            <a:r>
+              <a:rPr lang="en-US" dirty="0" smtClean="0"/>
+              <a:t> and </a:t>
+            </a:r>
+            <a:r>
+              <a:rPr lang="en-US" dirty="0" err="1" smtClean="0"/>
+              <a:t>Jython’s</a:t>
+            </a:r>
+            <a:r>
+              <a:rPr lang="en-US" dirty="0" smtClean="0"/>
+              <a:t> JIT compilers</a:t>
+            </a:r>
+            <a:endParaRPr lang="en-US" dirty="0" smtClean="0"/>
+          </a:p>
+          <a:p>
+            <a:r>
+              <a:rPr lang="en-US" dirty="0" smtClean="0"/>
+              <a:t>PyPy 2 is faster than PyPy 3 largely because </a:t>
+            </a:r>
+            <a:r>
+              <a:rPr lang="en-US" dirty="0" err="1" smtClean="0"/>
+              <a:t>CPython</a:t>
+            </a:r>
+            <a:r>
+              <a:rPr lang="en-US" dirty="0" smtClean="0"/>
+              <a:t> 2 is faster than </a:t>
+            </a:r>
+            <a:r>
+              <a:rPr lang="en-US" dirty="0" err="1" smtClean="0"/>
+              <a:t>CPython</a:t>
+            </a:r>
+            <a:r>
+              <a:rPr lang="en-US" dirty="0" smtClean="0"/>
+              <a:t> 3 </a:t>
+            </a:r>
+            <a:endParaRPr lang="en-US" dirty="0"/>
+          </a:p>
+          <a:p>
+            <a:pPr marL="0" indent="0">
+              <a:buNone/>
+            </a:pPr>
+            <a:endParaRPr lang="en-US" dirty="0" smtClean="0"/>
+          </a:p>
+          <a:p>
+            <a:r>
+              <a:rPr lang="en-US" dirty="0"/>
+              <a:t>Efficient garbage collector that results in programs using less </a:t>
+            </a:r>
+            <a:r>
+              <a:rPr lang="en-US" dirty="0" smtClean="0"/>
+              <a:t>memory</a:t>
+            </a:r>
+          </a:p>
+          <a:p>
+            <a:r>
+              <a:rPr lang="en-US" dirty="0" smtClean="0"/>
+              <a:t>PyPy 2 is compatible with all of Python 2.7’s core language</a:t>
+            </a:r>
+          </a:p>
+          <a:p>
+            <a:r>
+              <a:rPr lang="en-US" dirty="0" smtClean="0"/>
+              <a:t>PyPy 3 is compatible with most of Python 3.6.9’s core language</a:t>
             </a:r>
             <a:endParaRPr lang="en-US" dirty="0"/>
           </a:p>
@@ -5063,20 +5150,69 @@
           <a:p>
             <a:r>
               <a:rPr lang="en-US" dirty="0" smtClean="0"/>
-              <a:t>And then you explain what it is and why its FASTER THAN </a:t>
+              <a:t>The default Python implementation</a:t>
+            </a:r>
+          </a:p>
+          <a:p>
+            <a:r>
+              <a:rPr lang="en-US" dirty="0" smtClean="0"/>
+              <a:t>Uses an interpreter</a:t>
+            </a:r>
+          </a:p>
+          <a:p>
+            <a:pPr lvl="1"/>
+            <a:r>
+              <a:rPr lang="en-US" dirty="0"/>
+              <a:t>Ends up being faster than </a:t>
+            </a:r>
+            <a:r>
+              <a:rPr lang="en-US" dirty="0" err="1"/>
+              <a:t>IronPython</a:t>
+            </a:r>
+            <a:r>
+              <a:rPr lang="en-US" dirty="0"/>
+              <a:t> and </a:t>
+            </a:r>
+            <a:r>
+              <a:rPr lang="en-US" dirty="0" err="1"/>
+              <a:t>Jython’s</a:t>
+            </a:r>
+            <a:r>
+              <a:rPr lang="en-US" dirty="0"/>
+              <a:t> JIT </a:t>
+            </a:r>
+            <a:r>
+              <a:rPr lang="en-US" dirty="0" smtClean="0"/>
+              <a:t>compilers</a:t>
+            </a:r>
+            <a:endParaRPr lang="en-US" dirty="0"/>
+          </a:p>
+          <a:p>
+            <a:r>
+              <a:rPr lang="en-US" dirty="0" smtClean="0"/>
+              <a:t>CPython 2 is faster than CPython 3 due to the fact that, in CPython 3, an int is what a long was in CPython 2, and longs do not exist</a:t>
+            </a:r>
+          </a:p>
+          <a:p>
+            <a:pPr lvl="1"/>
+            <a:r>
+              <a:rPr lang="en-US" dirty="0" smtClean="0"/>
+              <a:t>Thus, every operation with an int takes longer in </a:t>
             </a:r>
             <a:r>
               <a:rPr lang="en-US" dirty="0" err="1" smtClean="0"/>
-              <a:t>OTHEr</a:t>
-            </a:r>
-            <a:r>
-              <a:rPr lang="en-US" dirty="0" smtClean="0"/>
-              <a:t> 2 (USUALLY), maybe a little repeat of why Slower than </a:t>
-            </a:r>
-            <a:r>
-              <a:rPr lang="en-US" dirty="0" err="1" smtClean="0"/>
-              <a:t>pypy</a:t>
-            </a:r>
+              <a:t>CPython</a:t>
+            </a:r>
+            <a:r>
+              <a:rPr lang="en-US" dirty="0" smtClean="0"/>
+              <a:t> 3</a:t>
+            </a:r>
+          </a:p>
+          <a:p>
+            <a:pPr lvl="1"/>
+            <a:endParaRPr lang="en-US" dirty="0"/>
+          </a:p>
+          <a:p>
             <a:endParaRPr lang="en-US" dirty="0"/>
           </a:p>
         </p:txBody>
@@ -5138,7 +5274,7 @@
           <a:p>
             <a:r>
               <a:rPr lang="en-US" sz="4800" dirty="0" smtClean="0"/>
-              <a:t>IRONPYTHON</a:t>
+              <a:t>JYTHON</a:t>
             </a:r>
             <a:endParaRPr lang="en-US" sz="4800" dirty="0"/>
           </a:p>
@@ -5190,12 +5326,28 @@
               <a:rPr lang="en-US" dirty="0" err="1" smtClean="0"/>
               <a:t>cpython</a:t>
             </a:r>
+            <a:r>
+              <a:rPr lang="en-US" dirty="0" smtClean="0"/>
+              <a:t> and iron, will be mostly same as </a:t>
+            </a:r>
+            <a:r>
+              <a:rPr lang="en-US" dirty="0" err="1" smtClean="0"/>
+              <a:t>ironpython</a:t>
+            </a:r>
+            <a:r>
+              <a:rPr lang="en-US" dirty="0" smtClean="0"/>
+              <a:t> </a:t>
+            </a:r>
+            <a:r>
+              <a:rPr lang="en-US" dirty="0" err="1" smtClean="0"/>
+              <a:t>reasosn</a:t>
+            </a:r>
             <a:endParaRPr lang="en-US" dirty="0" smtClean="0"/>
           </a:p>
           <a:p>
             <a:r>
               <a:rPr lang="en-US" dirty="0" smtClean="0"/>
-              <a:t>ALSO ADVANTAGES OF NET</a:t>
+              <a:t>ALSO ADVANTAGES OF JVM</a:t>
             </a:r>
             <a:endParaRPr lang="en-US" dirty="0"/>
           </a:p>
@@ -5204,7 +5356,7 @@
     </p:spTree>
     <p:extLst>
       <p:ext uri="{BB962C8B-B14F-4D97-AF65-F5344CB8AC3E}">
-        <p14:creationId xmlns:p14="http://schemas.microsoft.com/office/powerpoint/2010/main" val="2559285261"/>
+        <p14:creationId xmlns:p14="http://schemas.microsoft.com/office/powerpoint/2010/main" val="3038569920"/>
       </p:ext>
     </p:extLst>
   </p:cSld>
@@ -5258,7 +5410,7 @@
           <a:p>
             <a:r>
               <a:rPr lang="en-US" sz="4800" dirty="0" smtClean="0"/>
-              <a:t>JYTHON</a:t>
+              <a:t>IRONPYTHON</a:t>
             </a:r>
             <a:endParaRPr lang="en-US" sz="4800" dirty="0"/>
           </a:p>
@@ -5310,28 +5462,12 @@
               <a:rPr lang="en-US" dirty="0" err="1" smtClean="0"/>
               <a:t>cpython</a:t>
             </a:r>
-            <a:r>
-              <a:rPr lang="en-US" dirty="0" smtClean="0"/>
-              <a:t> and iron, will be mostly same as </a:t>
-            </a:r>
-            <a:r>
-              <a:rPr lang="en-US" dirty="0" err="1" smtClean="0"/>
-              <a:t>ironpython</a:t>
-            </a:r>
-            <a:r>
-              <a:rPr lang="en-US" dirty="0" smtClean="0"/>
-              <a:t> </a:t>
-            </a:r>
-            <a:r>
-              <a:rPr lang="en-US" dirty="0" err="1" smtClean="0"/>
-              <a:t>reasosn</a:t>
-            </a:r>
             <a:endParaRPr lang="en-US" dirty="0" smtClean="0"/>
           </a:p>
           <a:p>
             <a:r>
               <a:rPr lang="en-US" dirty="0" smtClean="0"/>
-              <a:t>ALSO ADVANTAGES OF JVM</a:t>
+              <a:t>ALSO ADVANTAGES OF NET</a:t>
             </a:r>
             <a:endParaRPr lang="en-US" dirty="0"/>
           </a:p>
@@ -5340,7 +5476,7 @@
     </p:spTree>
     <p:extLst>
       <p:ext uri="{BB962C8B-B14F-4D97-AF65-F5344CB8AC3E}">
-        <p14:creationId xmlns:p14="http://schemas.microsoft.com/office/powerpoint/2010/main" val="3038569920"/>
+        <p14:creationId xmlns:p14="http://schemas.microsoft.com/office/powerpoint/2010/main" val="2559285261"/>
       </p:ext>
     </p:extLst>
   </p:cSld>

</xml_diff>

<commit_message>
GW: Finished slides and writeup
</commit_message>
<xml_diff>
--- a/Presentation.pptx
+++ b/Presentation.pptx
@@ -13,10 +13,14 @@
     <p:sldId id="263" r:id="rId7"/>
     <p:sldId id="264" r:id="rId8"/>
     <p:sldId id="267" r:id="rId9"/>
-    <p:sldId id="266" r:id="rId10"/>
-    <p:sldId id="265" r:id="rId11"/>
-    <p:sldId id="269" r:id="rId12"/>
-    <p:sldId id="270" r:id="rId13"/>
+    <p:sldId id="265" r:id="rId10"/>
+    <p:sldId id="269" r:id="rId11"/>
+    <p:sldId id="275" r:id="rId12"/>
+    <p:sldId id="276" r:id="rId13"/>
+    <p:sldId id="277" r:id="rId14"/>
+    <p:sldId id="278" r:id="rId15"/>
+    <p:sldId id="279" r:id="rId16"/>
+    <p:sldId id="270" r:id="rId17"/>
   </p:sldIdLst>
   <p:sldSz cx="12192000" cy="6858000"/>
   <p:notesSz cx="6858000" cy="9144000"/>
@@ -297,7 +301,7 @@
             <a:fld id="{87DE6118-2437-4B30-8E3C-4D2BE6020583}" type="datetimeFigureOut">
               <a:rPr lang="en-US" smtClean="0"/>
               <a:pPr/>
-              <a:t>5/21/2020</a:t>
+              <a:t>5/27/2020</a:t>
             </a:fld>
             <a:endParaRPr lang="en-US" dirty="0"/>
           </a:p>
@@ -628,7 +632,7 @@
           <a:p>
             <a:fld id="{87DE6118-2437-4B30-8E3C-4D2BE6020583}" type="datetimeFigureOut">
               <a:rPr lang="en-US" smtClean="0"/>
-              <a:t>5/21/2020</a:t>
+              <a:t>5/27/2020</a:t>
             </a:fld>
             <a:endParaRPr lang="en-US" dirty="0"/>
           </a:p>
@@ -808,7 +812,7 @@
           <a:p>
             <a:fld id="{87DE6118-2437-4B30-8E3C-4D2BE6020583}" type="datetimeFigureOut">
               <a:rPr lang="en-US" smtClean="0"/>
-              <a:t>5/21/2020</a:t>
+              <a:t>5/27/2020</a:t>
             </a:fld>
             <a:endParaRPr lang="en-US" dirty="0"/>
           </a:p>
@@ -978,7 +982,7 @@
           <a:p>
             <a:fld id="{87DE6118-2437-4B30-8E3C-4D2BE6020583}" type="datetimeFigureOut">
               <a:rPr lang="en-US" smtClean="0"/>
-              <a:t>5/21/2020</a:t>
+              <a:t>5/27/2020</a:t>
             </a:fld>
             <a:endParaRPr lang="en-US" dirty="0"/>
           </a:p>
@@ -1256,7 +1260,7 @@
             <a:fld id="{87DE6118-2437-4B30-8E3C-4D2BE6020583}" type="datetimeFigureOut">
               <a:rPr lang="en-US" smtClean="0"/>
               <a:pPr/>
-              <a:t>5/21/2020</a:t>
+              <a:t>5/27/2020</a:t>
             </a:fld>
             <a:endParaRPr lang="en-US" dirty="0"/>
           </a:p>
@@ -1651,7 +1655,7 @@
           <a:p>
             <a:fld id="{87DE6118-2437-4B30-8E3C-4D2BE6020583}" type="datetimeFigureOut">
               <a:rPr lang="en-US" smtClean="0"/>
-              <a:t>5/21/2020</a:t>
+              <a:t>5/27/2020</a:t>
             </a:fld>
             <a:endParaRPr lang="en-US" dirty="0"/>
           </a:p>
@@ -2128,7 +2132,7 @@
           <a:p>
             <a:fld id="{87DE6118-2437-4B30-8E3C-4D2BE6020583}" type="datetimeFigureOut">
               <a:rPr lang="en-US" smtClean="0"/>
-              <a:t>5/21/2020</a:t>
+              <a:t>5/27/2020</a:t>
             </a:fld>
             <a:endParaRPr lang="en-US" dirty="0"/>
           </a:p>
@@ -2246,7 +2250,7 @@
           <a:p>
             <a:fld id="{87DE6118-2437-4B30-8E3C-4D2BE6020583}" type="datetimeFigureOut">
               <a:rPr lang="en-US" smtClean="0"/>
-              <a:t>5/21/2020</a:t>
+              <a:t>5/27/2020</a:t>
             </a:fld>
             <a:endParaRPr lang="en-US" dirty="0"/>
           </a:p>
@@ -2341,7 +2345,7 @@
           <a:p>
             <a:fld id="{87DE6118-2437-4B30-8E3C-4D2BE6020583}" type="datetimeFigureOut">
               <a:rPr lang="en-US" smtClean="0"/>
-              <a:t>5/21/2020</a:t>
+              <a:t>5/27/2020</a:t>
             </a:fld>
             <a:endParaRPr lang="en-US" dirty="0"/>
           </a:p>
@@ -2688,7 +2692,7 @@
             <a:fld id="{87DE6118-2437-4B30-8E3C-4D2BE6020583}" type="datetimeFigureOut">
               <a:rPr lang="en-US" smtClean="0"/>
               <a:pPr/>
-              <a:t>5/21/2020</a:t>
+              <a:t>5/27/2020</a:t>
             </a:fld>
             <a:endParaRPr lang="en-US" dirty="0"/>
           </a:p>
@@ -3078,7 +3082,7 @@
             <a:fld id="{87DE6118-2437-4B30-8E3C-4D2BE6020583}" type="datetimeFigureOut">
               <a:rPr lang="en-US" smtClean="0"/>
               <a:pPr/>
-              <a:t>5/21/2020</a:t>
+              <a:t>5/27/2020</a:t>
             </a:fld>
             <a:endParaRPr lang="en-US" dirty="0"/>
           </a:p>
@@ -3358,7 +3362,7 @@
             <a:fld id="{87DE6118-2437-4B30-8E3C-4D2BE6020583}" type="datetimeFigureOut">
               <a:rPr lang="en-US" smtClean="0"/>
               <a:pPr/>
-              <a:t>5/21/2020</a:t>
+              <a:t>5/27/2020</a:t>
             </a:fld>
             <a:endParaRPr lang="en-US" dirty="0"/>
           </a:p>
@@ -3960,6 +3964,13 @@
   <p:clrMapOvr>
     <a:masterClrMapping/>
   </p:clrMapOvr>
+  <p:timing>
+    <p:tnLst>
+      <p:par>
+        <p:cTn id="1" dur="indefinite" restart="never" nodeType="tmRoot"/>
+      </p:par>
+    </p:tnLst>
+  </p:timing>
 </p:sld>
 </file>
 
@@ -4026,7 +4037,7 @@
         <p:spPr>
           <a:xfrm>
             <a:off x="1371600" y="1820092"/>
-            <a:ext cx="9601200" cy="4354286"/>
+            <a:ext cx="10001794" cy="4354286"/>
           </a:xfrm>
         </p:spPr>
         <p:txBody>
@@ -4037,36 +4048,46 @@
           <a:p>
             <a:r>
               <a:rPr lang="en-US" dirty="0" smtClean="0"/>
-              <a:t>JUST KEEP GOING UNTIL DONE</a:t>
-            </a:r>
-          </a:p>
-          <a:p>
-            <a:r>
-              <a:rPr lang="en-US" dirty="0" smtClean="0"/>
-              <a:t>Probably include </a:t>
-            </a:r>
-            <a:r>
-              <a:rPr lang="en-US" dirty="0" err="1" smtClean="0"/>
-              <a:t>smol</a:t>
-            </a:r>
-            <a:r>
-              <a:rPr lang="en-US" dirty="0" smtClean="0"/>
-              <a:t> graphs</a:t>
-            </a:r>
-          </a:p>
-          <a:p>
-            <a:r>
-              <a:rPr lang="en-US" dirty="0" smtClean="0"/>
-              <a:t>Also mention exact numbers where it would help</a:t>
-            </a:r>
-            <a:endParaRPr lang="en-US" dirty="0"/>
-          </a:p>
-        </p:txBody>
-      </p:sp>
+              <a:t>In the following programs, CPython is much closer to Jython and IronPython in terms of performance, due to it using an interpreter</a:t>
+            </a:r>
+          </a:p>
+          <a:p>
+            <a:pPr lvl="1"/>
+            <a:r>
+              <a:rPr lang="en-US" dirty="0" smtClean="0"/>
+              <a:t>These programs are mostly loops, which can be optimized by Jython and IronPython’s respective JIT compilers</a:t>
+            </a:r>
+          </a:p>
+        </p:txBody>
+      </p:sp>
+      <p:pic>
+        <p:nvPicPr>
+          <p:cNvPr id="8" name="Picture 7"/>
+          <p:cNvPicPr>
+            <a:picLocks noChangeAspect="1"/>
+          </p:cNvPicPr>
+          <p:nvPr/>
+        </p:nvPicPr>
+        <p:blipFill>
+          <a:blip r:embed="rId2"/>
+          <a:stretch>
+            <a:fillRect/>
+          </a:stretch>
+        </p:blipFill>
+        <p:spPr>
+          <a:xfrm>
+            <a:off x="1296468" y="3605349"/>
+            <a:ext cx="10152058" cy="2907091"/>
+          </a:xfrm>
+          <a:prstGeom prst="rect">
+            <a:avLst/>
+          </a:prstGeom>
+        </p:spPr>
+      </p:pic>
     </p:spTree>
     <p:extLst>
       <p:ext uri="{BB962C8B-B14F-4D97-AF65-F5344CB8AC3E}">
-        <p14:creationId xmlns:p14="http://schemas.microsoft.com/office/powerpoint/2010/main" val="2210555060"/>
+        <p14:creationId xmlns:p14="http://schemas.microsoft.com/office/powerpoint/2010/main" val="3455537478"/>
       </p:ext>
     </p:extLst>
   </p:cSld>
@@ -4139,7 +4160,7 @@
         <p:spPr>
           <a:xfrm>
             <a:off x="1371600" y="1820092"/>
-            <a:ext cx="9601200" cy="4354286"/>
+            <a:ext cx="10001794" cy="4354286"/>
           </a:xfrm>
         </p:spPr>
         <p:txBody>
@@ -4150,30 +4171,46 @@
           <a:p>
             <a:r>
               <a:rPr lang="en-US" dirty="0" smtClean="0"/>
-              <a:t>JUST KEEP GOING UNTIL DONE</a:t>
-            </a:r>
-          </a:p>
-          <a:p>
-            <a:r>
-              <a:rPr lang="en-US" dirty="0" smtClean="0"/>
-              <a:t>Probably include </a:t>
-            </a:r>
-            <a:r>
-              <a:rPr lang="en-US" dirty="0" err="1" smtClean="0"/>
-              <a:t>smol</a:t>
-            </a:r>
-            <a:r>
-              <a:rPr lang="en-US" dirty="0" smtClean="0"/>
-              <a:t> graphs</a:t>
-            </a:r>
-            <a:endParaRPr lang="en-US" dirty="0"/>
-          </a:p>
-        </p:txBody>
-      </p:sp>
+              <a:t>In Spectral Norm 6 and especially 100 Prisoners, CPython 3 is much slower than CPython 2, due to the difference in their ints</a:t>
+            </a:r>
+          </a:p>
+          <a:p>
+            <a:pPr lvl="1"/>
+            <a:r>
+              <a:rPr lang="en-US" dirty="0" smtClean="0"/>
+              <a:t>These programs contain a lot of complex calculations, amplifying the additional time it takes to operate on ints in CPython 3</a:t>
+            </a:r>
+          </a:p>
+        </p:txBody>
+      </p:sp>
+      <p:pic>
+        <p:nvPicPr>
+          <p:cNvPr id="8" name="Picture 7"/>
+          <p:cNvPicPr>
+            <a:picLocks noChangeAspect="1"/>
+          </p:cNvPicPr>
+          <p:nvPr/>
+        </p:nvPicPr>
+        <p:blipFill>
+          <a:blip r:embed="rId2"/>
+          <a:stretch>
+            <a:fillRect/>
+          </a:stretch>
+        </p:blipFill>
+        <p:spPr>
+          <a:xfrm>
+            <a:off x="1296468" y="3605349"/>
+            <a:ext cx="10152058" cy="2907091"/>
+          </a:xfrm>
+          <a:prstGeom prst="rect">
+            <a:avLst/>
+          </a:prstGeom>
+        </p:spPr>
+      </p:pic>
     </p:spTree>
     <p:extLst>
       <p:ext uri="{BB962C8B-B14F-4D97-AF65-F5344CB8AC3E}">
-        <p14:creationId xmlns:p14="http://schemas.microsoft.com/office/powerpoint/2010/main" val="3455537478"/>
+        <p14:creationId xmlns:p14="http://schemas.microsoft.com/office/powerpoint/2010/main" val="1814521179"/>
       </p:ext>
     </p:extLst>
   </p:cSld>
@@ -4227,7 +4264,7 @@
           <a:p>
             <a:r>
               <a:rPr lang="en-US" sz="4800" dirty="0" smtClean="0"/>
-              <a:t>CONCLUSIONS</a:t>
+              <a:t>EXCEPTIONS</a:t>
             </a:r>
             <a:endParaRPr lang="en-US" sz="4800" dirty="0"/>
           </a:p>
@@ -4246,7 +4283,7 @@
         <p:spPr>
           <a:xfrm>
             <a:off x="1371600" y="1820092"/>
-            <a:ext cx="9601200" cy="4354286"/>
+            <a:ext cx="10158550" cy="4354286"/>
           </a:xfrm>
         </p:spPr>
         <p:txBody>
@@ -4257,39 +4294,574 @@
           <a:p>
             <a:r>
               <a:rPr lang="en-US" dirty="0" smtClean="0"/>
-              <a:t>?</a:t>
-            </a:r>
-          </a:p>
-          <a:p>
-            <a:r>
-              <a:rPr lang="en-US" dirty="0" smtClean="0"/>
-              <a:t>Maybe</a:t>
-            </a:r>
-          </a:p>
-          <a:p>
+              <a:t>In N-Body 1, PyPy is much slower than in N-Body 2, due to the difference in how the programs calculate the square root of a number</a:t>
+            </a:r>
+          </a:p>
+          <a:p>
+            <a:pPr lvl="1"/>
+            <a:r>
+              <a:rPr lang="en-US" dirty="0" smtClean="0"/>
+              <a:t>N-Body 1 uses </a:t>
+            </a:r>
+            <a:r>
+              <a:rPr lang="en-US" dirty="0"/>
+              <a:t>“** 0.5</a:t>
+            </a:r>
+            <a:r>
+              <a:rPr lang="en-US" dirty="0" smtClean="0"/>
+              <a:t>” while N-Body 2 uses “</a:t>
+            </a:r>
             <a:r>
               <a:rPr lang="en-US" dirty="0" err="1" smtClean="0"/>
-              <a:t>Rember</a:t>
-            </a:r>
-            <a:r>
-              <a:rPr lang="en-US" dirty="0" smtClean="0"/>
-              <a:t> to add links to programs, </a:t>
+              <a:t>math.sqrt</a:t>
+            </a:r>
+            <a:r>
+              <a:rPr lang="en-US" dirty="0" smtClean="0"/>
+              <a:t>()”</a:t>
+            </a:r>
+          </a:p>
+          <a:p>
+            <a:pPr lvl="1"/>
+            <a:r>
+              <a:rPr lang="en-US" dirty="0" smtClean="0"/>
+              <a:t>The former is slower than the latter in Python in general, but in PyPy, it is far slower</a:t>
+            </a:r>
+            <a:endParaRPr lang="en-US" dirty="0"/>
+          </a:p>
+        </p:txBody>
+      </p:sp>
+      <p:pic>
+        <p:nvPicPr>
+          <p:cNvPr id="8" name="Picture 7"/>
+          <p:cNvPicPr>
+            <a:picLocks noChangeAspect="1"/>
+          </p:cNvPicPr>
+          <p:nvPr/>
+        </p:nvPicPr>
+        <p:blipFill>
+          <a:blip r:embed="rId2"/>
+          <a:stretch>
+            <a:fillRect/>
+          </a:stretch>
+        </p:blipFill>
+        <p:spPr>
+          <a:xfrm>
+            <a:off x="1296468" y="3605349"/>
+            <a:ext cx="10152058" cy="2907091"/>
+          </a:xfrm>
+          <a:prstGeom prst="rect">
+            <a:avLst/>
+          </a:prstGeom>
+        </p:spPr>
+      </p:pic>
+    </p:spTree>
+    <p:extLst>
+      <p:ext uri="{BB962C8B-B14F-4D97-AF65-F5344CB8AC3E}">
+        <p14:creationId xmlns:p14="http://schemas.microsoft.com/office/powerpoint/2010/main" val="3972297997"/>
+      </p:ext>
+    </p:extLst>
+  </p:cSld>
+  <p:clrMapOvr>
+    <a:masterClrMapping/>
+  </p:clrMapOvr>
+</p:sld>
+</file>
+
+<file path=ppt/slides/slide13.xml><?xml version="1.0" encoding="utf-8"?>
+<p:sld xmlns:a="http://schemas.openxmlformats.org/drawingml/2006/main" xmlns:r="http://schemas.openxmlformats.org/officeDocument/2006/relationships" xmlns:p="http://schemas.openxmlformats.org/presentationml/2006/main">
+  <p:cSld>
+    <p:bg>
+      <p:bgPr>
+        <a:solidFill>
+          <a:srgbClr val="E1ECEE"/>
+        </a:solidFill>
+        <a:effectLst/>
+      </p:bgPr>
+    </p:bg>
+    <p:spTree>
+      <p:nvGrpSpPr>
+        <p:cNvPr id="1" name=""/>
+        <p:cNvGrpSpPr/>
+        <p:nvPr/>
+      </p:nvGrpSpPr>
+      <p:grpSpPr>
+        <a:xfrm>
+          <a:off x="0" y="0"/>
+          <a:ext cx="0" cy="0"/>
+          <a:chOff x="0" y="0"/>
+          <a:chExt cx="0" cy="0"/>
+        </a:xfrm>
+      </p:grpSpPr>
+      <p:sp>
+        <p:nvSpPr>
+          <p:cNvPr id="2" name="Title 1"/>
+          <p:cNvSpPr>
+            <a:spLocks noGrp="1"/>
+          </p:cNvSpPr>
+          <p:nvPr>
+            <p:ph type="title"/>
+          </p:nvPr>
+        </p:nvSpPr>
+        <p:spPr/>
+        <p:txBody>
+          <a:bodyPr>
+            <a:normAutofit/>
+          </a:bodyPr>
+          <a:lstStyle/>
+          <a:p>
+            <a:r>
+              <a:rPr lang="en-US" sz="4800" dirty="0" smtClean="0"/>
+              <a:t>EXCEPTIONS</a:t>
+            </a:r>
+            <a:endParaRPr lang="en-US" sz="4800" dirty="0"/>
+          </a:p>
+        </p:txBody>
+      </p:sp>
+      <p:sp>
+        <p:nvSpPr>
+          <p:cNvPr id="3" name="Content Placeholder 2"/>
+          <p:cNvSpPr>
+            <a:spLocks noGrp="1"/>
+          </p:cNvSpPr>
+          <p:nvPr>
+            <p:ph idx="1"/>
+          </p:nvPr>
+        </p:nvSpPr>
+        <p:spPr>
+          <a:xfrm>
+            <a:off x="1371600" y="1820092"/>
+            <a:ext cx="10158550" cy="4354286"/>
+          </a:xfrm>
+        </p:spPr>
+        <p:txBody>
+          <a:bodyPr>
+            <a:normAutofit/>
+          </a:bodyPr>
+          <a:lstStyle/>
+          <a:p>
+            <a:r>
+              <a:rPr lang="en-US" dirty="0" smtClean="0"/>
+              <a:t>In Pi Digits 4, CPython is faster than PyPy, due to the use of global variables</a:t>
+            </a:r>
+          </a:p>
+          <a:p>
+            <a:pPr lvl="1"/>
+            <a:r>
+              <a:rPr lang="en-US" dirty="0" smtClean="0"/>
+              <a:t>Global variables cause a noticeable decrease in performance in Python in general, but this effect is exacerbated in PyPy</a:t>
+            </a:r>
+            <a:endParaRPr lang="en-US" dirty="0"/>
+          </a:p>
+        </p:txBody>
+      </p:sp>
+      <p:pic>
+        <p:nvPicPr>
+          <p:cNvPr id="6" name="Picture 5"/>
+          <p:cNvPicPr>
+            <a:picLocks noChangeAspect="1"/>
+          </p:cNvPicPr>
+          <p:nvPr/>
+        </p:nvPicPr>
+        <p:blipFill>
+          <a:blip r:embed="rId2"/>
+          <a:stretch>
+            <a:fillRect/>
+          </a:stretch>
+        </p:blipFill>
+        <p:spPr>
+          <a:xfrm>
+            <a:off x="1128354" y="3683726"/>
+            <a:ext cx="10645041" cy="2802132"/>
+          </a:xfrm>
+          <a:prstGeom prst="rect">
+            <a:avLst/>
+          </a:prstGeom>
+        </p:spPr>
+      </p:pic>
+    </p:spTree>
+    <p:extLst>
+      <p:ext uri="{BB962C8B-B14F-4D97-AF65-F5344CB8AC3E}">
+        <p14:creationId xmlns:p14="http://schemas.microsoft.com/office/powerpoint/2010/main" val="511204610"/>
+      </p:ext>
+    </p:extLst>
+  </p:cSld>
+  <p:clrMapOvr>
+    <a:masterClrMapping/>
+  </p:clrMapOvr>
+</p:sld>
+</file>
+
+<file path=ppt/slides/slide14.xml><?xml version="1.0" encoding="utf-8"?>
+<p:sld xmlns:a="http://schemas.openxmlformats.org/drawingml/2006/main" xmlns:r="http://schemas.openxmlformats.org/officeDocument/2006/relationships" xmlns:p="http://schemas.openxmlformats.org/presentationml/2006/main">
+  <p:cSld>
+    <p:bg>
+      <p:bgPr>
+        <a:solidFill>
+          <a:srgbClr val="E1ECEE"/>
+        </a:solidFill>
+        <a:effectLst/>
+      </p:bgPr>
+    </p:bg>
+    <p:spTree>
+      <p:nvGrpSpPr>
+        <p:cNvPr id="1" name=""/>
+        <p:cNvGrpSpPr/>
+        <p:nvPr/>
+      </p:nvGrpSpPr>
+      <p:grpSpPr>
+        <a:xfrm>
+          <a:off x="0" y="0"/>
+          <a:ext cx="0" cy="0"/>
+          <a:chOff x="0" y="0"/>
+          <a:chExt cx="0" cy="0"/>
+        </a:xfrm>
+      </p:grpSpPr>
+      <p:sp>
+        <p:nvSpPr>
+          <p:cNvPr id="2" name="Title 1"/>
+          <p:cNvSpPr>
+            <a:spLocks noGrp="1"/>
+          </p:cNvSpPr>
+          <p:nvPr>
+            <p:ph type="title"/>
+          </p:nvPr>
+        </p:nvSpPr>
+        <p:spPr/>
+        <p:txBody>
+          <a:bodyPr>
+            <a:normAutofit/>
+          </a:bodyPr>
+          <a:lstStyle/>
+          <a:p>
+            <a:r>
+              <a:rPr lang="en-US" sz="4800" dirty="0" smtClean="0"/>
+              <a:t>EXCEPTIONS</a:t>
+            </a:r>
+            <a:endParaRPr lang="en-US" sz="4800" dirty="0"/>
+          </a:p>
+        </p:txBody>
+      </p:sp>
+      <p:sp>
+        <p:nvSpPr>
+          <p:cNvPr id="3" name="Content Placeholder 2"/>
+          <p:cNvSpPr>
+            <a:spLocks noGrp="1"/>
+          </p:cNvSpPr>
+          <p:nvPr>
+            <p:ph idx="1"/>
+          </p:nvPr>
+        </p:nvSpPr>
+        <p:spPr>
+          <a:xfrm>
+            <a:off x="1371600" y="1820092"/>
+            <a:ext cx="10027920" cy="4354286"/>
+          </a:xfrm>
+        </p:spPr>
+        <p:txBody>
+          <a:bodyPr>
+            <a:normAutofit/>
+          </a:bodyPr>
+          <a:lstStyle/>
+          <a:p>
+            <a:r>
+              <a:rPr lang="en-US" dirty="0" smtClean="0"/>
+              <a:t>In Knight’s Tour, CPython and PyPy 3 are faster than CPython and PyPy 2, respectively</a:t>
+            </a:r>
+          </a:p>
+          <a:p>
+            <a:pPr lvl="1"/>
+            <a:r>
+              <a:rPr lang="en-US" dirty="0" smtClean="0"/>
+              <a:t>This program uses “</a:t>
             </a:r>
             <a:r>
               <a:rPr lang="en-US" dirty="0" err="1" smtClean="0"/>
-              <a:t>proboboly</a:t>
-            </a:r>
-            <a:r>
-              <a:rPr lang="en-US" dirty="0" smtClean="0"/>
-              <a:t> in </a:t>
-            </a:r>
-            <a:r>
-              <a:rPr lang="en-US" dirty="0" err="1" smtClean="0"/>
-              <a:t>writeup</a:t>
-            </a:r>
-            <a:r>
-              <a:rPr lang="en-US" dirty="0" smtClean="0"/>
-              <a:t>, but maybe here, too</a:t>
+              <a:t>copy.deepcopy</a:t>
+            </a:r>
+            <a:r>
+              <a:rPr lang="en-US" dirty="0" smtClean="0"/>
+              <a:t>()”, which is almost twice as slow in Python 2 than it is in Python 3</a:t>
+            </a:r>
+          </a:p>
+          <a:p>
+            <a:pPr lvl="1"/>
+            <a:r>
+              <a:rPr lang="en-US" dirty="0" smtClean="0"/>
+              <a:t>This function was made more efficient for Python 3</a:t>
+            </a:r>
+            <a:endParaRPr lang="en-US" dirty="0"/>
+          </a:p>
+        </p:txBody>
+      </p:sp>
+      <p:pic>
+        <p:nvPicPr>
+          <p:cNvPr id="6" name="Picture 5"/>
+          <p:cNvPicPr>
+            <a:picLocks noChangeAspect="1"/>
+          </p:cNvPicPr>
+          <p:nvPr/>
+        </p:nvPicPr>
+        <p:blipFill>
+          <a:blip r:embed="rId2"/>
+          <a:stretch>
+            <a:fillRect/>
+          </a:stretch>
+        </p:blipFill>
+        <p:spPr>
+          <a:xfrm>
+            <a:off x="1119646" y="3689468"/>
+            <a:ext cx="10662458" cy="2830786"/>
+          </a:xfrm>
+          <a:prstGeom prst="rect">
+            <a:avLst/>
+          </a:prstGeom>
+        </p:spPr>
+      </p:pic>
+    </p:spTree>
+    <p:extLst>
+      <p:ext uri="{BB962C8B-B14F-4D97-AF65-F5344CB8AC3E}">
+        <p14:creationId xmlns:p14="http://schemas.microsoft.com/office/powerpoint/2010/main" val="1172369183"/>
+      </p:ext>
+    </p:extLst>
+  </p:cSld>
+  <p:clrMapOvr>
+    <a:masterClrMapping/>
+  </p:clrMapOvr>
+</p:sld>
+</file>
+
+<file path=ppt/slides/slide15.xml><?xml version="1.0" encoding="utf-8"?>
+<p:sld xmlns:a="http://schemas.openxmlformats.org/drawingml/2006/main" xmlns:r="http://schemas.openxmlformats.org/officeDocument/2006/relationships" xmlns:p="http://schemas.openxmlformats.org/presentationml/2006/main">
+  <p:cSld>
+    <p:bg>
+      <p:bgPr>
+        <a:solidFill>
+          <a:srgbClr val="E1ECEE"/>
+        </a:solidFill>
+        <a:effectLst/>
+      </p:bgPr>
+    </p:bg>
+    <p:spTree>
+      <p:nvGrpSpPr>
+        <p:cNvPr id="1" name=""/>
+        <p:cNvGrpSpPr/>
+        <p:nvPr/>
+      </p:nvGrpSpPr>
+      <p:grpSpPr>
+        <a:xfrm>
+          <a:off x="0" y="0"/>
+          <a:ext cx="0" cy="0"/>
+          <a:chOff x="0" y="0"/>
+          <a:chExt cx="0" cy="0"/>
+        </a:xfrm>
+      </p:grpSpPr>
+      <p:sp>
+        <p:nvSpPr>
+          <p:cNvPr id="2" name="Title 1"/>
+          <p:cNvSpPr>
+            <a:spLocks noGrp="1"/>
+          </p:cNvSpPr>
+          <p:nvPr>
+            <p:ph type="title"/>
+          </p:nvPr>
+        </p:nvSpPr>
+        <p:spPr/>
+        <p:txBody>
+          <a:bodyPr>
+            <a:normAutofit/>
+          </a:bodyPr>
+          <a:lstStyle/>
+          <a:p>
+            <a:r>
+              <a:rPr lang="en-US" sz="4800" dirty="0" smtClean="0"/>
+              <a:t>EXCEPTIONS</a:t>
+            </a:r>
+            <a:endParaRPr lang="en-US" sz="4800" dirty="0"/>
+          </a:p>
+        </p:txBody>
+      </p:sp>
+      <p:sp>
+        <p:nvSpPr>
+          <p:cNvPr id="3" name="Content Placeholder 2"/>
+          <p:cNvSpPr>
+            <a:spLocks noGrp="1"/>
+          </p:cNvSpPr>
+          <p:nvPr>
+            <p:ph idx="1"/>
+          </p:nvPr>
+        </p:nvSpPr>
+        <p:spPr>
+          <a:xfrm>
+            <a:off x="1371600" y="1820092"/>
+            <a:ext cx="10158550" cy="4354286"/>
+          </a:xfrm>
+        </p:spPr>
+        <p:txBody>
+          <a:bodyPr>
+            <a:normAutofit/>
+          </a:bodyPr>
+          <a:lstStyle/>
+          <a:p>
+            <a:r>
+              <a:rPr lang="en-US" dirty="0" smtClean="0"/>
+              <a:t>In Four Squares, execution is trivial for all implementations except Jython and IronPython</a:t>
+            </a:r>
+          </a:p>
+          <a:p>
+            <a:pPr lvl="1"/>
+            <a:r>
+              <a:rPr lang="en-US" dirty="0" smtClean="0"/>
+              <a:t>This program finds all unique solutions to a problem and prints them out</a:t>
+            </a:r>
+          </a:p>
+          <a:p>
+            <a:pPr lvl="1"/>
+            <a:r>
+              <a:rPr lang="en-US" dirty="0" smtClean="0"/>
+              <a:t>Printing them out (to the console) is extremely slow for the JVM and the CLR</a:t>
+            </a:r>
+            <a:endParaRPr lang="en-US" dirty="0"/>
+          </a:p>
+        </p:txBody>
+      </p:sp>
+      <p:pic>
+        <p:nvPicPr>
+          <p:cNvPr id="4" name="Picture 3"/>
+          <p:cNvPicPr>
+            <a:picLocks noChangeAspect="1"/>
+          </p:cNvPicPr>
+          <p:nvPr/>
+        </p:nvPicPr>
+        <p:blipFill>
+          <a:blip r:embed="rId2"/>
+          <a:stretch>
+            <a:fillRect/>
+          </a:stretch>
+        </p:blipFill>
+        <p:spPr>
+          <a:xfrm>
+            <a:off x="1144089" y="3709852"/>
+            <a:ext cx="10613571" cy="2837766"/>
+          </a:xfrm>
+          <a:prstGeom prst="rect">
+            <a:avLst/>
+          </a:prstGeom>
+        </p:spPr>
+      </p:pic>
+    </p:spTree>
+    <p:extLst>
+      <p:ext uri="{BB962C8B-B14F-4D97-AF65-F5344CB8AC3E}">
+        <p14:creationId xmlns:p14="http://schemas.microsoft.com/office/powerpoint/2010/main" val="3298570286"/>
+      </p:ext>
+    </p:extLst>
+  </p:cSld>
+  <p:clrMapOvr>
+    <a:masterClrMapping/>
+  </p:clrMapOvr>
+</p:sld>
+</file>
+
+<file path=ppt/slides/slide16.xml><?xml version="1.0" encoding="utf-8"?>
+<p:sld xmlns:a="http://schemas.openxmlformats.org/drawingml/2006/main" xmlns:r="http://schemas.openxmlformats.org/officeDocument/2006/relationships" xmlns:p="http://schemas.openxmlformats.org/presentationml/2006/main">
+  <p:cSld>
+    <p:bg>
+      <p:bgPr>
+        <a:solidFill>
+          <a:srgbClr val="E1ECEE"/>
+        </a:solidFill>
+        <a:effectLst/>
+      </p:bgPr>
+    </p:bg>
+    <p:spTree>
+      <p:nvGrpSpPr>
+        <p:cNvPr id="1" name=""/>
+        <p:cNvGrpSpPr/>
+        <p:nvPr/>
+      </p:nvGrpSpPr>
+      <p:grpSpPr>
+        <a:xfrm>
+          <a:off x="0" y="0"/>
+          <a:ext cx="0" cy="0"/>
+          <a:chOff x="0" y="0"/>
+          <a:chExt cx="0" cy="0"/>
+        </a:xfrm>
+      </p:grpSpPr>
+      <p:sp>
+        <p:nvSpPr>
+          <p:cNvPr id="2" name="Title 1"/>
+          <p:cNvSpPr>
+            <a:spLocks noGrp="1"/>
+          </p:cNvSpPr>
+          <p:nvPr>
+            <p:ph type="title"/>
+          </p:nvPr>
+        </p:nvSpPr>
+        <p:spPr/>
+        <p:txBody>
+          <a:bodyPr>
+            <a:normAutofit/>
+          </a:bodyPr>
+          <a:lstStyle/>
+          <a:p>
+            <a:r>
+              <a:rPr lang="en-US" sz="4800" dirty="0" smtClean="0"/>
+              <a:t>CONCLUSIONS</a:t>
+            </a:r>
+            <a:endParaRPr lang="en-US" sz="4800" dirty="0"/>
+          </a:p>
+        </p:txBody>
+      </p:sp>
+      <p:sp>
+        <p:nvSpPr>
+          <p:cNvPr id="3" name="Content Placeholder 2"/>
+          <p:cNvSpPr>
+            <a:spLocks noGrp="1"/>
+          </p:cNvSpPr>
+          <p:nvPr>
+            <p:ph idx="1"/>
+          </p:nvPr>
+        </p:nvSpPr>
+        <p:spPr>
+          <a:xfrm>
+            <a:off x="1371600" y="1820092"/>
+            <a:ext cx="9993086" cy="4354286"/>
+          </a:xfrm>
+        </p:spPr>
+        <p:txBody>
+          <a:bodyPr>
+            <a:normAutofit/>
+          </a:bodyPr>
+          <a:lstStyle/>
+          <a:p>
+            <a:r>
+              <a:rPr lang="en-US" dirty="0" smtClean="0"/>
+              <a:t>Due to its speed and compatibility with Python, PyPy should be used whenever possible</a:t>
+            </a:r>
+            <a:endParaRPr lang="en-US" dirty="0" smtClean="0"/>
+          </a:p>
+          <a:p>
+            <a:r>
+              <a:rPr lang="en-US" dirty="0" smtClean="0"/>
+              <a:t>CPython is a competent default, when compared to other Python implementations</a:t>
+            </a:r>
+            <a:endParaRPr lang="en-US" dirty="0" smtClean="0"/>
+          </a:p>
+          <a:p>
+            <a:r>
+              <a:rPr lang="en-US" dirty="0" smtClean="0"/>
+              <a:t>Jython and IronPython’s performance is acceptable if access to either the Java or .NET libraries, respectively, is necessary</a:t>
+            </a:r>
+          </a:p>
+          <a:p>
+            <a:pPr marL="0" indent="0">
+              <a:buNone/>
+            </a:pPr>
+            <a:endParaRPr lang="en-US" dirty="0" smtClean="0"/>
+          </a:p>
+          <a:p>
+            <a:r>
+              <a:rPr lang="en-US" dirty="0" smtClean="0"/>
+              <a:t>None of the implementations completely outclass any of the others</a:t>
             </a:r>
             <a:endParaRPr lang="en-US" dirty="0"/>
           </a:p>
@@ -4425,10 +4997,9 @@
           </a:p>
           <a:p>
             <a:r>
-              <a:rPr lang="en-US" dirty="0" err="1" smtClean="0"/>
+              <a:rPr lang="en-US" dirty="0" smtClean="0"/>
               <a:t>IronPython</a:t>
             </a:r>
-            <a:endParaRPr lang="en-US" dirty="0" smtClean="0"/>
           </a:p>
           <a:p>
             <a:pPr lvl="1"/>
@@ -4440,16 +5011,15 @@
           </a:p>
           <a:p>
             <a:r>
-              <a:rPr lang="en-US" dirty="0" err="1" smtClean="0"/>
+              <a:rPr lang="en-US" dirty="0" smtClean="0"/>
               <a:t>Jython</a:t>
             </a:r>
-            <a:endParaRPr lang="en-US" dirty="0" smtClean="0"/>
           </a:p>
           <a:p>
             <a:pPr lvl="1"/>
             <a:r>
               <a:rPr lang="en-US" dirty="0" smtClean="0"/>
-              <a:t>Runs Python 2 on the Java Virtual Machine</a:t>
+              <a:t>Runs Python 2 on the Java Virtual Machine (JVM)</a:t>
             </a:r>
             <a:endParaRPr lang="en-US" dirty="0"/>
           </a:p>
@@ -4465,6 +5035,13 @@
   <p:clrMapOvr>
     <a:masterClrMapping/>
   </p:clrMapOvr>
+  <p:timing>
+    <p:tnLst>
+      <p:par>
+        <p:cTn id="1" dur="indefinite" restart="never" nodeType="tmRoot"/>
+      </p:par>
+    </p:tnLst>
+  </p:timing>
 </p:sld>
 </file>
 
@@ -4556,20 +5133,8 @@
           </a:p>
           <a:p>
             <a:r>
-              <a:rPr lang="en-US" dirty="0" err="1" smtClean="0"/>
-              <a:t>Fannkuch</a:t>
-            </a:r>
-            <a:r>
-              <a:rPr lang="en-US" dirty="0" smtClean="0"/>
-              <a:t> </a:t>
-            </a:r>
-            <a:r>
-              <a:rPr lang="en-US" dirty="0" err="1" smtClean="0"/>
-              <a:t>Redux</a:t>
-            </a:r>
-            <a:r>
-              <a:rPr lang="en-US" dirty="0" smtClean="0"/>
-              <a:t> 6</a:t>
+              <a:rPr lang="en-US" dirty="0" smtClean="0"/>
+              <a:t>Fannkuch Redux 6</a:t>
             </a:r>
           </a:p>
           <a:p>
@@ -4657,6 +5222,13 @@
   <p:clrMapOvr>
     <a:masterClrMapping/>
   </p:clrMapOvr>
+  <p:timing>
+    <p:tnLst>
+      <p:par>
+        <p:cTn id="1" dur="indefinite" restart="never" nodeType="tmRoot"/>
+      </p:par>
+    </p:tnLst>
+  </p:timing>
 </p:sld>
 </file>
 
@@ -4974,61 +5546,20 @@
             <a:pPr lvl="1"/>
             <a:r>
               <a:rPr lang="en-US" dirty="0" smtClean="0"/>
-              <a:t>Like most compilers, is faster than </a:t>
-            </a:r>
-            <a:r>
-              <a:rPr lang="en-US" dirty="0" err="1" smtClean="0"/>
-              <a:t>CPython’s</a:t>
-            </a:r>
-            <a:r>
-              <a:rPr lang="en-US" dirty="0" smtClean="0"/>
-              <a:t> interpreter</a:t>
+              <a:t>Like most compilers, is faster than CPython’s interpreter</a:t>
             </a:r>
           </a:p>
           <a:p>
             <a:pPr lvl="1"/>
             <a:r>
               <a:rPr lang="en-US" dirty="0" smtClean="0"/>
-              <a:t>Ends up being faster than </a:t>
-            </a:r>
-            <a:r>
-              <a:rPr lang="en-US" dirty="0" err="1" smtClean="0"/>
-              <a:t>IronPython</a:t>
-            </a:r>
-            <a:r>
-              <a:rPr lang="en-US" dirty="0" smtClean="0"/>
-              <a:t> and </a:t>
-            </a:r>
-            <a:r>
-              <a:rPr lang="en-US" dirty="0" err="1" smtClean="0"/>
-              <a:t>Jython’s</a:t>
-            </a:r>
-            <a:r>
-              <a:rPr lang="en-US" dirty="0" smtClean="0"/>
-              <a:t> JIT compilers</a:t>
-            </a:r>
-            <a:endParaRPr lang="en-US" dirty="0" smtClean="0"/>
-          </a:p>
-          <a:p>
-            <a:r>
-              <a:rPr lang="en-US" dirty="0" smtClean="0"/>
-              <a:t>PyPy 2 is faster than PyPy 3 largely because </a:t>
-            </a:r>
-            <a:r>
-              <a:rPr lang="en-US" dirty="0" err="1" smtClean="0"/>
-              <a:t>CPython</a:t>
-            </a:r>
-            <a:r>
-              <a:rPr lang="en-US" dirty="0" smtClean="0"/>
-              <a:t> 2 is faster than </a:t>
-            </a:r>
-            <a:r>
-              <a:rPr lang="en-US" dirty="0" err="1" smtClean="0"/>
-              <a:t>CPython</a:t>
-            </a:r>
-            <a:r>
-              <a:rPr lang="en-US" dirty="0" smtClean="0"/>
-              <a:t> 3 </a:t>
+              <a:t>Ends up being faster than IronPython and Jython’s JIT compilers</a:t>
+            </a:r>
+          </a:p>
+          <a:p>
+            <a:r>
+              <a:rPr lang="en-US" dirty="0" smtClean="0"/>
+              <a:t>PyPy 2 is faster than PyPy 3 largely because CPython 2 is faster than CPython 3 </a:t>
             </a:r>
             <a:endParaRPr lang="en-US" dirty="0"/>
           </a:p>
@@ -5163,23 +5694,7 @@
             <a:pPr lvl="1"/>
             <a:r>
               <a:rPr lang="en-US" dirty="0"/>
-              <a:t>Ends up being faster than </a:t>
-            </a:r>
-            <a:r>
-              <a:rPr lang="en-US" dirty="0" err="1"/>
-              <a:t>IronPython</a:t>
-            </a:r>
-            <a:r>
-              <a:rPr lang="en-US" dirty="0"/>
-              <a:t> and </a:t>
-            </a:r>
-            <a:r>
-              <a:rPr lang="en-US" dirty="0" err="1"/>
-              <a:t>Jython’s</a:t>
-            </a:r>
-            <a:r>
-              <a:rPr lang="en-US" dirty="0"/>
-              <a:t> JIT </a:t>
+              <a:t>Ends up being faster than IronPython and Jython’s JIT </a:t>
             </a:r>
             <a:r>
               <a:rPr lang="en-US" dirty="0" smtClean="0"/>
@@ -5197,15 +5712,7 @@
             <a:pPr lvl="1"/>
             <a:r>
               <a:rPr lang="en-US" dirty="0" smtClean="0"/>
-              <a:t>Thus, every operation with an int takes longer in </a:t>
-            </a:r>
-            <a:r>
-              <a:rPr lang="en-US" dirty="0" err="1" smtClean="0"/>
-              <a:t>CPython</a:t>
-            </a:r>
-            <a:r>
-              <a:rPr lang="en-US" dirty="0" smtClean="0"/>
-              <a:t> 3</a:t>
+              <a:t>Thus, every operation with an int takes longer in CPython 3</a:t>
             </a:r>
           </a:p>
           <a:p>
@@ -5274,7 +5781,7 @@
           <a:p>
             <a:r>
               <a:rPr lang="en-US" sz="4800" dirty="0" smtClean="0"/>
-              <a:t>JYTHON</a:t>
+              <a:t>JYTHON &amp; IRONPYTHON</a:t>
             </a:r>
             <a:endParaRPr lang="en-US" sz="4800" dirty="0"/>
           </a:p>
@@ -5304,50 +5811,45 @@
           <a:p>
             <a:r>
               <a:rPr lang="en-US" dirty="0" smtClean="0"/>
-              <a:t>And then you explain what it is and why its FASTER THAN </a:t>
-            </a:r>
-            <a:r>
-              <a:rPr lang="en-US" dirty="0" err="1" smtClean="0"/>
-              <a:t>OTHEr</a:t>
-            </a:r>
-            <a:r>
-              <a:rPr lang="en-US" dirty="0" smtClean="0"/>
-              <a:t> 2 (USUALLY), maybe a little repeat of why Slower than </a:t>
-            </a:r>
-            <a:r>
-              <a:rPr lang="en-US" dirty="0" err="1" smtClean="0"/>
-              <a:t>pypy</a:t>
-            </a:r>
-            <a:r>
-              <a:rPr lang="en-US" dirty="0" smtClean="0"/>
-              <a:t> and </a:t>
-            </a:r>
-            <a:r>
-              <a:rPr lang="en-US" dirty="0" err="1" smtClean="0"/>
-              <a:t>cpython</a:t>
-            </a:r>
-            <a:r>
-              <a:rPr lang="en-US" dirty="0" smtClean="0"/>
-              <a:t> and iron, will be mostly same as </a:t>
-            </a:r>
-            <a:r>
-              <a:rPr lang="en-US" dirty="0" err="1" smtClean="0"/>
-              <a:t>ironpython</a:t>
-            </a:r>
-            <a:r>
-              <a:rPr lang="en-US" dirty="0" smtClean="0"/>
-              <a:t> </a:t>
-            </a:r>
-            <a:r>
-              <a:rPr lang="en-US" dirty="0" err="1" smtClean="0"/>
-              <a:t>reasosn</a:t>
-            </a:r>
+              <a:t>Jython is a Java implementation of Python that runs on the JVM</a:t>
+            </a:r>
+          </a:p>
+          <a:p>
+            <a:pPr lvl="1"/>
+            <a:r>
+              <a:rPr lang="en-US" dirty="0" smtClean="0"/>
+              <a:t>Has access to all of Java’s libraries </a:t>
+            </a:r>
+          </a:p>
+          <a:p>
+            <a:r>
+              <a:rPr lang="en-US" dirty="0" smtClean="0"/>
+              <a:t>IronPython is a C# implementation of Python that runs on the CLR</a:t>
+            </a:r>
+          </a:p>
+          <a:p>
+            <a:pPr lvl="1"/>
+            <a:r>
+              <a:rPr lang="en-US" dirty="0" smtClean="0"/>
+              <a:t>Has access to all .NET libraries</a:t>
+            </a:r>
+          </a:p>
+          <a:p>
+            <a:pPr marL="530352" lvl="1" indent="0">
+              <a:buNone/>
+            </a:pPr>
             <a:endParaRPr lang="en-US" dirty="0" smtClean="0"/>
           </a:p>
           <a:p>
             <a:r>
               <a:rPr lang="en-US" dirty="0" smtClean="0"/>
-              <a:t>ALSO ADVANTAGES OF JVM</a:t>
+              <a:t>Both have their respective JIT compilers, but are the two slowest implementations due to inefficient translation into bytecode</a:t>
+            </a:r>
+          </a:p>
+          <a:p>
+            <a:r>
+              <a:rPr lang="en-US" dirty="0" smtClean="0"/>
+              <a:t>Jython is a bit faster than IronPython because the JVM only compiles “hot” methods and interprets the rest, while the CLR compiles everything</a:t>
             </a:r>
             <a:endParaRPr lang="en-US" dirty="0"/>
           </a:p>
@@ -5410,7 +5912,7 @@
           <a:p>
             <a:r>
               <a:rPr lang="en-US" sz="4800" dirty="0" smtClean="0"/>
-              <a:t>IRONPYTHON</a:t>
+              <a:t>EXCEPTIONS</a:t>
             </a:r>
             <a:endParaRPr lang="en-US" sz="4800" dirty="0"/>
           </a:p>
@@ -5440,43 +5942,68 @@
           <a:p>
             <a:r>
               <a:rPr lang="en-US" dirty="0" smtClean="0"/>
-              <a:t>And then you explain what it is and why its FASTER THAN </a:t>
-            </a:r>
-            <a:r>
-              <a:rPr lang="en-US" dirty="0" err="1" smtClean="0"/>
-              <a:t>OTHEr</a:t>
-            </a:r>
-            <a:r>
-              <a:rPr lang="en-US" dirty="0" smtClean="0"/>
-              <a:t> 2 (USUALLY), maybe a little repeat of why Slower than </a:t>
-            </a:r>
-            <a:r>
-              <a:rPr lang="en-US" dirty="0" err="1" smtClean="0"/>
-              <a:t>pypy</a:t>
-            </a:r>
-            <a:r>
-              <a:rPr lang="en-US" dirty="0" smtClean="0"/>
-              <a:t> and </a:t>
-            </a:r>
-            <a:r>
-              <a:rPr lang="en-US" dirty="0" err="1" smtClean="0"/>
-              <a:t>cpython</a:t>
-            </a:r>
-            <a:endParaRPr lang="en-US" dirty="0" smtClean="0"/>
-          </a:p>
-          <a:p>
-            <a:r>
-              <a:rPr lang="en-US" dirty="0" smtClean="0"/>
-              <a:t>ALSO ADVANTAGES OF NET</a:t>
-            </a:r>
-            <a:endParaRPr lang="en-US" dirty="0"/>
-          </a:p>
-        </p:txBody>
-      </p:sp>
+              <a:t>Jython performance suffers from a ~9.5 second JVM startup time</a:t>
+            </a:r>
+          </a:p>
+          <a:p>
+            <a:r>
+              <a:rPr lang="en-US" dirty="0" smtClean="0"/>
+              <a:t>IronPython </a:t>
+            </a:r>
+            <a:r>
+              <a:rPr lang="en-US" dirty="0"/>
+              <a:t>performance suffers from a </a:t>
+            </a:r>
+            <a:r>
+              <a:rPr lang="en-US" dirty="0" smtClean="0"/>
+              <a:t>~1.5 </a:t>
+            </a:r>
+            <a:r>
+              <a:rPr lang="en-US" dirty="0"/>
+              <a:t>second </a:t>
+            </a:r>
+            <a:r>
+              <a:rPr lang="en-US" dirty="0" smtClean="0"/>
+              <a:t>CLR startup </a:t>
+            </a:r>
+            <a:r>
+              <a:rPr lang="en-US" dirty="0"/>
+              <a:t>time</a:t>
+            </a:r>
+          </a:p>
+          <a:p>
+            <a:endParaRPr lang="en-US" dirty="0"/>
+          </a:p>
+        </p:txBody>
+      </p:sp>
+      <p:pic>
+        <p:nvPicPr>
+          <p:cNvPr id="6" name="Picture 5"/>
+          <p:cNvPicPr>
+            <a:picLocks noChangeAspect="1"/>
+          </p:cNvPicPr>
+          <p:nvPr/>
+        </p:nvPicPr>
+        <p:blipFill>
+          <a:blip r:embed="rId2"/>
+          <a:stretch>
+            <a:fillRect/>
+          </a:stretch>
+        </p:blipFill>
+        <p:spPr>
+          <a:xfrm>
+            <a:off x="1371600" y="2699667"/>
+            <a:ext cx="10282709" cy="3986867"/>
+          </a:xfrm>
+          <a:prstGeom prst="rect">
+            <a:avLst/>
+          </a:prstGeom>
+        </p:spPr>
+      </p:pic>
     </p:spTree>
     <p:extLst>
       <p:ext uri="{BB962C8B-B14F-4D97-AF65-F5344CB8AC3E}">
-        <p14:creationId xmlns:p14="http://schemas.microsoft.com/office/powerpoint/2010/main" val="2559285261"/>
+        <p14:creationId xmlns:p14="http://schemas.microsoft.com/office/powerpoint/2010/main" val="2210555060"/>
       </p:ext>
     </p:extLst>
   </p:cSld>

</xml_diff>